<commit_message>
PDP - Programación funcional - C2
</commit_message>
<xml_diff>
--- a/Recursos Pedagogicos/Teoria/Paradigmas de Programación.pptx
+++ b/Recursos Pedagogicos/Teoria/Paradigmas de Programación.pptx
@@ -9,10 +9,11 @@
     <p:sldId id="257" r:id="rId3"/>
     <p:sldId id="258" r:id="rId4"/>
     <p:sldId id="259" r:id="rId5"/>
-    <p:sldId id="260" r:id="rId6"/>
-    <p:sldId id="261" r:id="rId7"/>
-    <p:sldId id="263" r:id="rId8"/>
-    <p:sldId id="262" r:id="rId9"/>
+    <p:sldId id="264" r:id="rId6"/>
+    <p:sldId id="260" r:id="rId7"/>
+    <p:sldId id="261" r:id="rId8"/>
+    <p:sldId id="263" r:id="rId9"/>
+    <p:sldId id="262" r:id="rId10"/>
   </p:sldIdLst>
   <p:sldSz cx="9144000" cy="6858000" type="screen4x3"/>
   <p:notesSz cx="6858000" cy="9144000"/>
@@ -295,7 +296,7 @@
           <a:p>
             <a:fld id="{D6BCFBBB-0119-4ABB-B3AB-A2C79DB1D2AC}" type="datetimeFigureOut">
               <a:rPr lang="es-AR" smtClean="0"/>
-              <a:t>17/8/2025</a:t>
+              <a:t>20/8/2025</a:t>
             </a:fld>
             <a:endParaRPr lang="es-AR"/>
           </a:p>
@@ -465,7 +466,7 @@
           <a:p>
             <a:fld id="{D6BCFBBB-0119-4ABB-B3AB-A2C79DB1D2AC}" type="datetimeFigureOut">
               <a:rPr lang="es-AR" smtClean="0"/>
-              <a:t>17/8/2025</a:t>
+              <a:t>20/8/2025</a:t>
             </a:fld>
             <a:endParaRPr lang="es-AR"/>
           </a:p>
@@ -645,7 +646,7 @@
           <a:p>
             <a:fld id="{D6BCFBBB-0119-4ABB-B3AB-A2C79DB1D2AC}" type="datetimeFigureOut">
               <a:rPr lang="es-AR" smtClean="0"/>
-              <a:t>17/8/2025</a:t>
+              <a:t>20/8/2025</a:t>
             </a:fld>
             <a:endParaRPr lang="es-AR"/>
           </a:p>
@@ -815,7 +816,7 @@
           <a:p>
             <a:fld id="{D6BCFBBB-0119-4ABB-B3AB-A2C79DB1D2AC}" type="datetimeFigureOut">
               <a:rPr lang="es-AR" smtClean="0"/>
-              <a:t>17/8/2025</a:t>
+              <a:t>20/8/2025</a:t>
             </a:fld>
             <a:endParaRPr lang="es-AR"/>
           </a:p>
@@ -1061,7 +1062,7 @@
           <a:p>
             <a:fld id="{D6BCFBBB-0119-4ABB-B3AB-A2C79DB1D2AC}" type="datetimeFigureOut">
               <a:rPr lang="es-AR" smtClean="0"/>
-              <a:t>17/8/2025</a:t>
+              <a:t>20/8/2025</a:t>
             </a:fld>
             <a:endParaRPr lang="es-AR"/>
           </a:p>
@@ -1349,7 +1350,7 @@
           <a:p>
             <a:fld id="{D6BCFBBB-0119-4ABB-B3AB-A2C79DB1D2AC}" type="datetimeFigureOut">
               <a:rPr lang="es-AR" smtClean="0"/>
-              <a:t>17/8/2025</a:t>
+              <a:t>20/8/2025</a:t>
             </a:fld>
             <a:endParaRPr lang="es-AR"/>
           </a:p>
@@ -1771,7 +1772,7 @@
           <a:p>
             <a:fld id="{D6BCFBBB-0119-4ABB-B3AB-A2C79DB1D2AC}" type="datetimeFigureOut">
               <a:rPr lang="es-AR" smtClean="0"/>
-              <a:t>17/8/2025</a:t>
+              <a:t>20/8/2025</a:t>
             </a:fld>
             <a:endParaRPr lang="es-AR"/>
           </a:p>
@@ -1889,7 +1890,7 @@
           <a:p>
             <a:fld id="{D6BCFBBB-0119-4ABB-B3AB-A2C79DB1D2AC}" type="datetimeFigureOut">
               <a:rPr lang="es-AR" smtClean="0"/>
-              <a:t>17/8/2025</a:t>
+              <a:t>20/8/2025</a:t>
             </a:fld>
             <a:endParaRPr lang="es-AR"/>
           </a:p>
@@ -1984,7 +1985,7 @@
           <a:p>
             <a:fld id="{D6BCFBBB-0119-4ABB-B3AB-A2C79DB1D2AC}" type="datetimeFigureOut">
               <a:rPr lang="es-AR" smtClean="0"/>
-              <a:t>17/8/2025</a:t>
+              <a:t>20/8/2025</a:t>
             </a:fld>
             <a:endParaRPr lang="es-AR"/>
           </a:p>
@@ -2261,7 +2262,7 @@
           <a:p>
             <a:fld id="{D6BCFBBB-0119-4ABB-B3AB-A2C79DB1D2AC}" type="datetimeFigureOut">
               <a:rPr lang="es-AR" smtClean="0"/>
-              <a:t>17/8/2025</a:t>
+              <a:t>20/8/2025</a:t>
             </a:fld>
             <a:endParaRPr lang="es-AR"/>
           </a:p>
@@ -2514,7 +2515,7 @@
           <a:p>
             <a:fld id="{D6BCFBBB-0119-4ABB-B3AB-A2C79DB1D2AC}" type="datetimeFigureOut">
               <a:rPr lang="es-AR" smtClean="0"/>
-              <a:t>17/8/2025</a:t>
+              <a:t>20/8/2025</a:t>
             </a:fld>
             <a:endParaRPr lang="es-AR"/>
           </a:p>
@@ -2727,7 +2728,7 @@
           <a:p>
             <a:fld id="{D6BCFBBB-0119-4ABB-B3AB-A2C79DB1D2AC}" type="datetimeFigureOut">
               <a:rPr lang="es-AR" smtClean="0"/>
-              <a:t>17/8/2025</a:t>
+              <a:t>20/8/2025</a:t>
             </a:fld>
             <a:endParaRPr lang="es-AR"/>
           </a:p>
@@ -3673,6 +3674,316 @@
     <p:bg>
       <p:bgPr>
         <a:solidFill>
+          <a:schemeClr val="tx1">
+            <a:lumMod val="95000"/>
+            <a:lumOff val="5000"/>
+            <a:alpha val="86000"/>
+          </a:schemeClr>
+        </a:solidFill>
+        <a:effectLst/>
+      </p:bgPr>
+    </p:bg>
+    <p:spTree>
+      <p:nvGrpSpPr>
+        <p:cNvPr id="1" name=""/>
+        <p:cNvGrpSpPr/>
+        <p:nvPr/>
+      </p:nvGrpSpPr>
+      <p:grpSpPr>
+        <a:xfrm>
+          <a:off x="0" y="0"/>
+          <a:ext cx="0" cy="0"/>
+          <a:chOff x="0" y="0"/>
+          <a:chExt cx="0" cy="0"/>
+        </a:xfrm>
+      </p:grpSpPr>
+      <p:sp>
+        <p:nvSpPr>
+          <p:cNvPr id="4" name="3 CuadroTexto"/>
+          <p:cNvSpPr txBox="1"/>
+          <p:nvPr/>
+        </p:nvSpPr>
+        <p:spPr>
+          <a:xfrm>
+            <a:off x="621728" y="1988840"/>
+            <a:ext cx="8054727" cy="2862322"/>
+          </a:xfrm>
+          <a:prstGeom prst="rect">
+            <a:avLst/>
+          </a:prstGeom>
+          <a:solidFill>
+            <a:srgbClr val="BCE3B7">
+              <a:alpha val="70980"/>
+            </a:srgbClr>
+          </a:solidFill>
+        </p:spPr>
+        <p:txBody>
+          <a:bodyPr wrap="square" rtlCol="0">
+            <a:spAutoFit/>
+          </a:bodyPr>
+          <a:lstStyle/>
+          <a:p>
+            <a:endParaRPr lang="es-MX" dirty="0" smtClean="0"/>
+          </a:p>
+          <a:p>
+            <a:r>
+              <a:rPr lang="es-MX" dirty="0" smtClean="0">
+                <a:latin typeface="Candara" panose="020E0502030303020204" pitchFamily="34" charset="0"/>
+              </a:rPr>
+              <a:t>Una </a:t>
+            </a:r>
+            <a:r>
+              <a:rPr lang="es-MX" dirty="0">
+                <a:latin typeface="Candara" panose="020E0502030303020204" pitchFamily="34" charset="0"/>
+              </a:rPr>
+              <a:t>función es un bloque de código reutilizable que nos evita repetir las mismas instrucciones cada vez que queremos hacer lo </a:t>
+            </a:r>
+            <a:r>
+              <a:rPr lang="es-MX" dirty="0" smtClean="0">
+                <a:latin typeface="Candara" panose="020E0502030303020204" pitchFamily="34" charset="0"/>
+              </a:rPr>
+              <a:t>mismo.</a:t>
+            </a:r>
+          </a:p>
+          <a:p>
+            <a:endParaRPr lang="es-MX" dirty="0" smtClean="0">
+              <a:latin typeface="Candara" panose="020E0502030303020204" pitchFamily="34" charset="0"/>
+            </a:endParaRPr>
+          </a:p>
+          <a:p>
+            <a:r>
+              <a:rPr lang="es-MX" dirty="0" smtClean="0">
+                <a:latin typeface="Candara" panose="020E0502030303020204" pitchFamily="34" charset="0"/>
+              </a:rPr>
+              <a:t>Ejemplo:</a:t>
+            </a:r>
+          </a:p>
+          <a:p>
+            <a:r>
+              <a:rPr lang="es-AR" dirty="0" smtClean="0"/>
+              <a:t>	Una </a:t>
+            </a:r>
+            <a:r>
+              <a:rPr lang="es-AR" b="1" dirty="0"/>
+              <a:t>función</a:t>
+            </a:r>
+            <a:r>
+              <a:rPr lang="es-AR" dirty="0"/>
+              <a:t> es como una </a:t>
+            </a:r>
+            <a:r>
+              <a:rPr lang="es-AR" b="1" dirty="0"/>
+              <a:t>receta</a:t>
+            </a:r>
+            <a:r>
+              <a:rPr lang="es-AR" dirty="0"/>
+              <a:t> o un </a:t>
+            </a:r>
+            <a:r>
+              <a:rPr lang="es-AR" b="1" dirty="0"/>
+              <a:t>mecanismo</a:t>
+            </a:r>
+            <a:r>
+              <a:rPr lang="es-AR" dirty="0"/>
+              <a:t> dentro de un programa:</a:t>
+            </a:r>
+          </a:p>
+          <a:p>
+            <a:pPr marL="1200150" lvl="2" indent="-285750">
+              <a:buFont typeface="Arial" panose="020B0604020202020204" pitchFamily="34" charset="0"/>
+              <a:buChar char="•"/>
+            </a:pPr>
+            <a:r>
+              <a:rPr lang="es-AR" dirty="0"/>
+              <a:t>Recibe ciertos </a:t>
+            </a:r>
+            <a:r>
+              <a:rPr lang="es-AR" b="1" dirty="0"/>
+              <a:t>ingredientes</a:t>
+            </a:r>
+            <a:r>
+              <a:rPr lang="es-AR" dirty="0"/>
+              <a:t> (llamados </a:t>
+            </a:r>
+            <a:r>
+              <a:rPr lang="es-AR" i="1" dirty="0"/>
+              <a:t>parámetros</a:t>
+            </a:r>
+            <a:r>
+              <a:rPr lang="es-AR" dirty="0"/>
+              <a:t> o </a:t>
+            </a:r>
+            <a:r>
+              <a:rPr lang="es-AR" i="1" dirty="0"/>
+              <a:t>argumentos</a:t>
+            </a:r>
+            <a:r>
+              <a:rPr lang="es-AR" dirty="0"/>
+              <a:t>).</a:t>
+            </a:r>
+          </a:p>
+          <a:p>
+            <a:pPr marL="1200150" lvl="2" indent="-285750">
+              <a:buFont typeface="Arial" panose="020B0604020202020204" pitchFamily="34" charset="0"/>
+              <a:buChar char="•"/>
+            </a:pPr>
+            <a:r>
+              <a:rPr lang="es-AR" dirty="0"/>
+              <a:t>Realiza un </a:t>
+            </a:r>
+            <a:r>
+              <a:rPr lang="es-AR" b="1" dirty="0"/>
+              <a:t>proceso</a:t>
+            </a:r>
+            <a:r>
+              <a:rPr lang="es-AR" dirty="0"/>
+              <a:t> (una serie de pasos definidos).</a:t>
+            </a:r>
+          </a:p>
+          <a:p>
+            <a:pPr marL="1200150" lvl="2" indent="-285750">
+              <a:buFont typeface="Arial" panose="020B0604020202020204" pitchFamily="34" charset="0"/>
+              <a:buChar char="•"/>
+            </a:pPr>
+            <a:r>
+              <a:rPr lang="es-AR" dirty="0"/>
+              <a:t>Devuelve un </a:t>
+            </a:r>
+            <a:r>
+              <a:rPr lang="es-AR" b="1" dirty="0"/>
+              <a:t>resultado</a:t>
+            </a:r>
+            <a:r>
+              <a:rPr lang="es-AR" dirty="0"/>
+              <a:t> (un valor) o ejecuta una </a:t>
+            </a:r>
+            <a:r>
+              <a:rPr lang="es-AR" b="1" dirty="0"/>
+              <a:t>acción</a:t>
+            </a:r>
+            <a:r>
+              <a:rPr lang="es-AR" dirty="0" smtClean="0"/>
+              <a:t>.</a:t>
+            </a:r>
+          </a:p>
+          <a:p>
+            <a:pPr marL="1200150" lvl="2" indent="-285750">
+              <a:buFont typeface="Arial" panose="020B0604020202020204" pitchFamily="34" charset="0"/>
+              <a:buChar char="•"/>
+            </a:pPr>
+            <a:endParaRPr lang="es-AR" dirty="0"/>
+          </a:p>
+        </p:txBody>
+      </p:sp>
+      <p:sp>
+        <p:nvSpPr>
+          <p:cNvPr id="2" name="1 Título"/>
+          <p:cNvSpPr>
+            <a:spLocks noGrp="1"/>
+          </p:cNvSpPr>
+          <p:nvPr>
+            <p:ph type="title"/>
+          </p:nvPr>
+        </p:nvSpPr>
+        <p:spPr>
+          <a:xfrm>
+            <a:off x="514049" y="548680"/>
+            <a:ext cx="8229600" cy="1143000"/>
+          </a:xfrm>
+        </p:spPr>
+        <p:txBody>
+          <a:bodyPr>
+            <a:normAutofit/>
+          </a:bodyPr>
+          <a:lstStyle/>
+          <a:p>
+            <a:r>
+              <a:rPr lang="es-MX" dirty="0" smtClean="0">
+                <a:solidFill>
+                  <a:schemeClr val="bg1"/>
+                </a:solidFill>
+                <a:latin typeface="Candara" panose="020E0502030303020204" pitchFamily="34" charset="0"/>
+              </a:rPr>
+              <a:t>¿Qué son </a:t>
+            </a:r>
+            <a:r>
+              <a:rPr lang="es-MX" dirty="0" smtClean="0">
+                <a:solidFill>
+                  <a:schemeClr val="bg1"/>
+                </a:solidFill>
+                <a:latin typeface="Candara" panose="020E0502030303020204" pitchFamily="34" charset="0"/>
+              </a:rPr>
+              <a:t>las funciones?</a:t>
+            </a:r>
+            <a:endParaRPr lang="es-AR" dirty="0">
+              <a:solidFill>
+                <a:schemeClr val="bg1"/>
+              </a:solidFill>
+              <a:latin typeface="Candara" panose="020E0502030303020204" pitchFamily="34" charset="0"/>
+            </a:endParaRPr>
+          </a:p>
+        </p:txBody>
+      </p:sp>
+      <p:pic>
+        <p:nvPicPr>
+          <p:cNvPr id="2051" name="Picture 3" descr="C:\Users\leo\Pictures\PDP\portada.PNG"/>
+          <p:cNvPicPr>
+            <a:picLocks noChangeAspect="1" noChangeArrowheads="1"/>
+          </p:cNvPicPr>
+          <p:nvPr/>
+        </p:nvPicPr>
+        <p:blipFill>
+          <a:blip r:embed="rId2" cstate="print">
+            <a:extLst>
+              <a:ext uri="{28A0092B-C50C-407E-A947-70E740481C1C}">
+                <a14:useLocalDpi xmlns:a14="http://schemas.microsoft.com/office/drawing/2010/main" val="0"/>
+              </a:ext>
+            </a:extLst>
+          </a:blip>
+          <a:srcRect/>
+          <a:stretch>
+            <a:fillRect/>
+          </a:stretch>
+        </p:blipFill>
+        <p:spPr bwMode="auto">
+          <a:xfrm>
+            <a:off x="6588224" y="5128620"/>
+            <a:ext cx="2234159" cy="1729380"/>
+          </a:xfrm>
+          <a:prstGeom prst="rect">
+            <a:avLst/>
+          </a:prstGeom>
+          <a:noFill/>
+          <a:extLst>
+            <a:ext uri="{909E8E84-426E-40DD-AFC4-6F175D3DCCD1}">
+              <a14:hiddenFill xmlns:a14="http://schemas.microsoft.com/office/drawing/2010/main">
+                <a:solidFill>
+                  <a:srgbClr val="FFFFFF"/>
+                </a:solidFill>
+              </a14:hiddenFill>
+            </a:ext>
+          </a:extLst>
+        </p:spPr>
+      </p:pic>
+    </p:spTree>
+    <p:extLst>
+      <p:ext uri="{BB962C8B-B14F-4D97-AF65-F5344CB8AC3E}">
+        <p14:creationId xmlns:p14="http://schemas.microsoft.com/office/powerpoint/2010/main" val="532263190"/>
+      </p:ext>
+    </p:extLst>
+  </p:cSld>
+  <p:clrMapOvr>
+    <a:masterClrMapping/>
+  </p:clrMapOvr>
+</p:sld>
+</file>
+
+<file path=ppt/slides/slide6.xml><?xml version="1.0" encoding="utf-8"?>
+<p:sld xmlns:a="http://schemas.openxmlformats.org/drawingml/2006/main" xmlns:r="http://schemas.openxmlformats.org/officeDocument/2006/relationships" xmlns:p="http://schemas.openxmlformats.org/presentationml/2006/main">
+  <p:cSld>
+    <p:bg>
+      <p:bgPr>
+        <a:solidFill>
           <a:srgbClr val="BCE3B7">
             <a:alpha val="24000"/>
           </a:srgbClr>
@@ -3818,7 +4129,7 @@
 </p:sld>
 </file>
 
-<file path=ppt/slides/slide6.xml><?xml version="1.0" encoding="utf-8"?>
+<file path=ppt/slides/slide7.xml><?xml version="1.0" encoding="utf-8"?>
 <p:sld xmlns:a="http://schemas.openxmlformats.org/drawingml/2006/main" xmlns:r="http://schemas.openxmlformats.org/officeDocument/2006/relationships" xmlns:p="http://schemas.openxmlformats.org/presentationml/2006/main">
   <p:cSld>
     <p:bg>
@@ -3933,7 +4244,7 @@
 </p:sld>
 </file>
 
-<file path=ppt/slides/slide7.xml><?xml version="1.0" encoding="utf-8"?>
+<file path=ppt/slides/slide8.xml><?xml version="1.0" encoding="utf-8"?>
 <p:sld xmlns:a="http://schemas.openxmlformats.org/drawingml/2006/main" xmlns:r="http://schemas.openxmlformats.org/officeDocument/2006/relationships" xmlns:p="http://schemas.openxmlformats.org/presentationml/2006/main">
   <p:cSld>
     <p:bg>
@@ -3968,8 +4279,8 @@
         </p:nvSpPr>
         <p:spPr>
           <a:xfrm>
-            <a:off x="467544" y="479081"/>
-            <a:ext cx="3818334" cy="4031873"/>
+            <a:off x="179512" y="479081"/>
+            <a:ext cx="4392488" cy="4216539"/>
           </a:xfrm>
           <a:prstGeom prst="rect">
             <a:avLst/>
@@ -3995,154 +4306,207 @@
             </a:endParaRPr>
           </a:p>
           <a:p>
-            <a:endParaRPr lang="es-MX" sz="3600" b="1" dirty="0" smtClean="0">
+            <a:r>
+              <a:rPr lang="es-MX" sz="1600" dirty="0">
+                <a:latin typeface="Candara" panose="020E0502030303020204" pitchFamily="34" charset="0"/>
+              </a:rPr>
+              <a:t>// Recibe como </a:t>
+            </a:r>
+            <a:r>
+              <a:rPr lang="es-MX" sz="1600" dirty="0" err="1">
+                <a:latin typeface="Candara" panose="020E0502030303020204" pitchFamily="34" charset="0"/>
+              </a:rPr>
+              <a:t>parametro</a:t>
+            </a:r>
+            <a:r>
+              <a:rPr lang="es-MX" sz="1600" dirty="0">
+                <a:latin typeface="Candara" panose="020E0502030303020204" pitchFamily="34" charset="0"/>
+              </a:rPr>
+              <a:t> una </a:t>
+            </a:r>
+            <a:r>
+              <a:rPr lang="es-MX" sz="1600" dirty="0" err="1">
+                <a:latin typeface="Candara" panose="020E0502030303020204" pitchFamily="34" charset="0"/>
+              </a:rPr>
+              <a:t>funcion</a:t>
+            </a:r>
+            <a:r>
+              <a:rPr lang="es-MX" sz="1600" dirty="0">
+                <a:latin typeface="Candara" panose="020E0502030303020204" pitchFamily="34" charset="0"/>
+              </a:rPr>
+              <a:t> y un número y retorna una función</a:t>
+            </a:r>
+            <a:r>
+              <a:rPr lang="es-MX" sz="1600" dirty="0" smtClean="0">
+                <a:latin typeface="Candara" panose="020E0502030303020204" pitchFamily="34" charset="0"/>
+              </a:rPr>
+              <a:t>...</a:t>
+            </a:r>
+          </a:p>
+          <a:p>
+            <a:endParaRPr lang="es-MX" sz="1600" dirty="0" smtClean="0">
               <a:latin typeface="Candara" panose="020E0502030303020204" pitchFamily="34" charset="0"/>
             </a:endParaRPr>
           </a:p>
           <a:p>
             <a:r>
-              <a:rPr lang="es-MX" sz="1100" b="1" dirty="0" smtClean="0">
-                <a:latin typeface="Consolas" panose="020B0609020204030204" pitchFamily="49" charset="0"/>
+              <a:rPr lang="es-MX" sz="1600" b="1" dirty="0">
+                <a:solidFill>
+                  <a:srgbClr val="00B050"/>
+                </a:solidFill>
+                <a:latin typeface="Candara" panose="020E0502030303020204" pitchFamily="34" charset="0"/>
               </a:rPr>
-              <a:t>const resultadoFuncion = funcion1(3,4);</a:t>
-            </a:r>
-          </a:p>
-          <a:p>
-            <a:endParaRPr lang="es-MX" sz="1100" b="1" dirty="0">
-              <a:latin typeface="Consolas" panose="020B0609020204030204" pitchFamily="49" charset="0"/>
+              <a:t>// recibe una función y un valor</a:t>
+            </a:r>
+          </a:p>
+          <a:p>
+            <a:endParaRPr lang="es-MX" sz="1600" dirty="0">
+              <a:latin typeface="Candara" panose="020E0502030303020204" pitchFamily="34" charset="0"/>
             </a:endParaRPr>
           </a:p>
           <a:p>
             <a:r>
-              <a:rPr lang="es-MX" sz="1100" dirty="0" smtClean="0">
-                <a:latin typeface="Consolas" panose="020B0609020204030204" pitchFamily="49" charset="0"/>
+              <a:rPr lang="es-MX" sz="1600" b="1" dirty="0" err="1">
+                <a:latin typeface="Candara" panose="020E0502030303020204" pitchFamily="34" charset="0"/>
               </a:rPr>
-              <a:t>console.log(</a:t>
-            </a:r>
-            <a:r>
-              <a:rPr lang="es-MX" sz="1200" b="1" dirty="0" err="1" smtClean="0">
+              <a:t>const</a:t>
+            </a:r>
+            <a:r>
+              <a:rPr lang="es-MX" sz="1600" b="1" dirty="0">
+                <a:latin typeface="Candara" panose="020E0502030303020204" pitchFamily="34" charset="0"/>
+              </a:rPr>
+              <a:t> aplicar = (</a:t>
+            </a:r>
+            <a:r>
+              <a:rPr lang="es-MX" sz="1600" b="1" dirty="0" err="1">
                 <a:solidFill>
-                  <a:schemeClr val="tx2">
-                    <a:lumMod val="60000"/>
-                    <a:lumOff val="40000"/>
-                  </a:schemeClr>
+                  <a:srgbClr val="FF0000"/>
                 </a:solidFill>
-                <a:latin typeface="Consolas" panose="020B0609020204030204" pitchFamily="49" charset="0"/>
+                <a:latin typeface="Candara" panose="020E0502030303020204" pitchFamily="34" charset="0"/>
               </a:rPr>
-              <a:t>resultadoFuncion</a:t>
-            </a:r>
-            <a:r>
-              <a:rPr lang="es-MX" sz="1200" b="1" dirty="0" smtClean="0">
+              <a:t>fn</a:t>
+            </a:r>
+            <a:r>
+              <a:rPr lang="es-MX" sz="1600" b="1" dirty="0">
+                <a:latin typeface="Candara" panose="020E0502030303020204" pitchFamily="34" charset="0"/>
+              </a:rPr>
+              <a:t>, </a:t>
+            </a:r>
+            <a:r>
+              <a:rPr lang="es-MX" sz="1600" b="1" dirty="0">
                 <a:solidFill>
-                  <a:schemeClr val="tx2">
-                    <a:lumMod val="60000"/>
-                    <a:lumOff val="40000"/>
-                  </a:schemeClr>
+                  <a:schemeClr val="accent5"/>
                 </a:solidFill>
-                <a:latin typeface="Consolas" panose="020B0609020204030204" pitchFamily="49" charset="0"/>
+                <a:latin typeface="Candara" panose="020E0502030303020204" pitchFamily="34" charset="0"/>
               </a:rPr>
-              <a:t>()</a:t>
-            </a:r>
-            <a:r>
-              <a:rPr lang="es-MX" sz="1100" dirty="0" smtClean="0">
-                <a:latin typeface="Consolas" panose="020B0609020204030204" pitchFamily="49" charset="0"/>
+              <a:t>x</a:t>
+            </a:r>
+            <a:r>
+              <a:rPr lang="es-MX" sz="1600" b="1" dirty="0">
+                <a:latin typeface="Candara" panose="020E0502030303020204" pitchFamily="34" charset="0"/>
+              </a:rPr>
+              <a:t>) =&gt; </a:t>
+            </a:r>
+            <a:r>
+              <a:rPr lang="es-MX" sz="1600" b="1" dirty="0" err="1">
+                <a:latin typeface="Candara" panose="020E0502030303020204" pitchFamily="34" charset="0"/>
+              </a:rPr>
+              <a:t>fn</a:t>
+            </a:r>
+            <a:r>
+              <a:rPr lang="es-MX" sz="1600" b="1" dirty="0">
+                <a:latin typeface="Candara" panose="020E0502030303020204" pitchFamily="34" charset="0"/>
+              </a:rPr>
+              <a:t>(x); </a:t>
+            </a:r>
+            <a:endParaRPr lang="es-MX" sz="1600" b="1" dirty="0" smtClean="0">
+              <a:latin typeface="Candara" panose="020E0502030303020204" pitchFamily="34" charset="0"/>
+            </a:endParaRPr>
+          </a:p>
+          <a:p>
+            <a:endParaRPr lang="es-MX" sz="1600" b="1" dirty="0">
+              <a:latin typeface="Candara" panose="020E0502030303020204" pitchFamily="34" charset="0"/>
+            </a:endParaRPr>
+          </a:p>
+          <a:p>
+            <a:r>
+              <a:rPr lang="es-MX" sz="1600" b="1" dirty="0" err="1" smtClean="0">
+                <a:latin typeface="Candara" panose="020E0502030303020204" pitchFamily="34" charset="0"/>
+              </a:rPr>
+              <a:t>const</a:t>
+            </a:r>
+            <a:r>
+              <a:rPr lang="es-MX" sz="1600" b="1" dirty="0" smtClean="0">
+                <a:latin typeface="Candara" panose="020E0502030303020204" pitchFamily="34" charset="0"/>
+              </a:rPr>
+              <a:t> </a:t>
+            </a:r>
+            <a:r>
+              <a:rPr lang="es-MX" sz="1600" b="1" dirty="0">
+                <a:latin typeface="Candara" panose="020E0502030303020204" pitchFamily="34" charset="0"/>
+              </a:rPr>
+              <a:t>r = aplicar(</a:t>
+            </a:r>
+            <a:r>
+              <a:rPr lang="es-MX" sz="1600" b="1" dirty="0">
+                <a:solidFill>
+                  <a:srgbClr val="FF0000"/>
+                </a:solidFill>
+                <a:latin typeface="Candara" panose="020E0502030303020204" pitchFamily="34" charset="0"/>
+              </a:rPr>
+              <a:t>n =&gt; n * 2</a:t>
+            </a:r>
+            <a:r>
+              <a:rPr lang="es-MX" sz="1600" b="1" dirty="0">
+                <a:latin typeface="Candara" panose="020E0502030303020204" pitchFamily="34" charset="0"/>
+              </a:rPr>
+              <a:t>, </a:t>
+            </a:r>
+            <a:r>
+              <a:rPr lang="es-MX" sz="1600" b="1" dirty="0">
+                <a:solidFill>
+                  <a:schemeClr val="accent5"/>
+                </a:solidFill>
+                <a:latin typeface="Candara" panose="020E0502030303020204" pitchFamily="34" charset="0"/>
+              </a:rPr>
+              <a:t>5</a:t>
+            </a:r>
+            <a:r>
+              <a:rPr lang="es-MX" sz="1600" b="1" dirty="0">
+                <a:latin typeface="Candara" panose="020E0502030303020204" pitchFamily="34" charset="0"/>
+              </a:rPr>
+              <a:t>);   </a:t>
+            </a:r>
+            <a:r>
+              <a:rPr lang="es-MX" sz="1600" b="1" dirty="0">
+                <a:solidFill>
+                  <a:srgbClr val="00B050"/>
+                </a:solidFill>
+                <a:latin typeface="Candara" panose="020E0502030303020204" pitchFamily="34" charset="0"/>
+              </a:rPr>
+              <a:t>// 10</a:t>
+            </a:r>
+          </a:p>
+          <a:p>
+            <a:endParaRPr lang="es-MX" sz="1600" b="1" dirty="0" smtClean="0">
+              <a:latin typeface="Candara" panose="020E0502030303020204" pitchFamily="34" charset="0"/>
+            </a:endParaRPr>
+          </a:p>
+          <a:p>
+            <a:r>
+              <a:rPr lang="es-MX" sz="1600" b="1" dirty="0" smtClean="0">
+                <a:latin typeface="Candara" panose="020E0502030303020204" pitchFamily="34" charset="0"/>
+              </a:rPr>
+              <a:t>console.log(r</a:t>
+            </a:r>
+            <a:r>
+              <a:rPr lang="es-MX" sz="1600" b="1" dirty="0">
+                <a:latin typeface="Candara" panose="020E0502030303020204" pitchFamily="34" charset="0"/>
               </a:rPr>
               <a:t>);</a:t>
             </a:r>
-          </a:p>
-          <a:p>
-            <a:endParaRPr lang="es-MX" sz="1100" b="1" dirty="0">
-              <a:latin typeface="Consolas" panose="020B0609020204030204" pitchFamily="49" charset="0"/>
-            </a:endParaRPr>
-          </a:p>
-          <a:p>
-            <a:endParaRPr lang="es-MX" sz="1100" b="1" dirty="0" smtClean="0">
-              <a:latin typeface="Consolas" panose="020B0609020204030204" pitchFamily="49" charset="0"/>
-            </a:endParaRPr>
-          </a:p>
-          <a:p>
-            <a:r>
-              <a:rPr lang="es-MX" sz="1100" b="1" dirty="0" smtClean="0">
-                <a:latin typeface="Consolas" panose="020B0609020204030204" pitchFamily="49" charset="0"/>
-              </a:rPr>
-              <a:t>Otra forma de poder llamar a la función seria:</a:t>
-            </a:r>
-          </a:p>
-          <a:p>
-            <a:endParaRPr lang="es-MX" sz="1100" b="1" dirty="0">
-              <a:latin typeface="Consolas" panose="020B0609020204030204" pitchFamily="49" charset="0"/>
-            </a:endParaRPr>
-          </a:p>
-          <a:p>
-            <a:r>
-              <a:rPr lang="es-MX" sz="1100" b="1" dirty="0" smtClean="0">
-                <a:latin typeface="Consolas" panose="020B0609020204030204" pitchFamily="49" charset="0"/>
-              </a:rPr>
-              <a:t>const resultado = </a:t>
-            </a:r>
-            <a:r>
-              <a:rPr lang="es-MX" sz="1200" b="1" dirty="0" smtClean="0">
-                <a:solidFill>
-                  <a:schemeClr val="tx2">
-                    <a:lumMod val="60000"/>
-                    <a:lumOff val="40000"/>
-                  </a:schemeClr>
-                </a:solidFill>
-                <a:latin typeface="Consolas" panose="020B0609020204030204" pitchFamily="49" charset="0"/>
-              </a:rPr>
-              <a:t>funcion1</a:t>
-            </a:r>
-            <a:r>
-              <a:rPr lang="es-MX" sz="1200" b="1" dirty="0" smtClean="0">
-                <a:solidFill>
-                  <a:schemeClr val="tx2"/>
-                </a:solidFill>
-                <a:latin typeface="Consolas" panose="020B0609020204030204" pitchFamily="49" charset="0"/>
-              </a:rPr>
-              <a:t>(</a:t>
-            </a:r>
-            <a:r>
-              <a:rPr lang="es-MX" sz="1200" b="1" dirty="0" smtClean="0">
-                <a:solidFill>
-                  <a:schemeClr val="tx2">
-                    <a:lumMod val="60000"/>
-                    <a:lumOff val="40000"/>
-                  </a:schemeClr>
-                </a:solidFill>
-                <a:latin typeface="Consolas" panose="020B0609020204030204" pitchFamily="49" charset="0"/>
-              </a:rPr>
-              <a:t>3,4</a:t>
-            </a:r>
-            <a:r>
-              <a:rPr lang="es-MX" sz="1200" b="1" dirty="0" smtClean="0">
-                <a:solidFill>
-                  <a:schemeClr val="tx2"/>
-                </a:solidFill>
-                <a:latin typeface="Consolas" panose="020B0609020204030204" pitchFamily="49" charset="0"/>
-              </a:rPr>
-              <a:t>)()</a:t>
-            </a:r>
-            <a:r>
-              <a:rPr lang="es-MX" sz="1100" b="1" dirty="0" smtClean="0">
-                <a:latin typeface="Consolas" panose="020B0609020204030204" pitchFamily="49" charset="0"/>
-              </a:rPr>
-              <a:t>;</a:t>
-            </a:r>
-          </a:p>
-          <a:p>
-            <a:endParaRPr lang="es-MX" sz="1100" b="1" dirty="0" smtClean="0">
-              <a:latin typeface="Consolas" panose="020B0609020204030204" pitchFamily="49" charset="0"/>
-            </a:endParaRPr>
-          </a:p>
-          <a:p>
-            <a:r>
-              <a:rPr lang="es-MX" sz="1100" dirty="0" smtClean="0">
-                <a:latin typeface="Consolas" panose="020B0609020204030204" pitchFamily="49" charset="0"/>
-              </a:rPr>
-              <a:t>console,.log(resultado);</a:t>
-            </a:r>
-            <a:endParaRPr lang="es-AR" sz="1100" dirty="0">
-              <a:latin typeface="Consolas" panose="020B0609020204030204" pitchFamily="49" charset="0"/>
+            <a:endParaRPr lang="es-MX" sz="1600" b="1" dirty="0" smtClean="0">
+              <a:latin typeface="Candara" panose="020E0502030303020204" pitchFamily="34" charset="0"/>
             </a:endParaRPr>
           </a:p>
         </p:txBody>
@@ -4201,7 +4565,7 @@
 </p:sld>
 </file>
 
-<file path=ppt/slides/slide8.xml><?xml version="1.0" encoding="utf-8"?>
+<file path=ppt/slides/slide9.xml><?xml version="1.0" encoding="utf-8"?>
 <p:sld xmlns:a="http://schemas.openxmlformats.org/drawingml/2006/main" xmlns:r="http://schemas.openxmlformats.org/officeDocument/2006/relationships" xmlns:p="http://schemas.openxmlformats.org/presentationml/2006/main">
   <p:cSld>
     <p:bg>

</xml_diff>